<commit_message>
Initilize stats + rearrange scripts
add Stat.cs
add CharacterStat.cs
add StatModifier.cs

+ Change the unit's movements to UnitMovement.cs

// ToDo: need to see how we make the stats work
</commit_message>
<xml_diff>
--- a/דוחות/מצגות/מצגת התקדמות.pptx
+++ b/דוחות/מצגות/מצגת התקדמות.pptx
@@ -25,7 +25,7 @@
     <p:sldId id="272" r:id="rId19"/>
     <p:sldId id="273" r:id="rId20"/>
     <p:sldId id="279" r:id="rId21"/>
-    <p:sldId id="268" r:id="rId22"/>
+    <p:sldId id="281" r:id="rId22"/>
   </p:sldIdLst>
   <p:sldSz cx="12192000" cy="6858000"/>
   <p:notesSz cx="6858000" cy="9144000"/>
@@ -153,7 +153,7 @@
             <p14:sldId id="272"/>
             <p14:sldId id="273"/>
             <p14:sldId id="279"/>
-            <p14:sldId id="268"/>
+            <p14:sldId id="281"/>
           </p14:sldIdLst>
         </p14:section>
       </p14:sectionLst>
@@ -15553,7 +15553,7 @@
           <a:p>
             <a:fld id="{2E5861C8-6E59-4B49-805F-F09502E84273}" type="datetimeFigureOut">
               <a:rPr lang="he-IL" smtClean="0"/>
-              <a:t>כ"ט/טבת/תשפ"ב</a:t>
+              <a:t>א'/שבט/תשפ"ב</a:t>
             </a:fld>
             <a:endParaRPr lang="he-IL"/>
           </a:p>
@@ -15774,7 +15774,7 @@
           <a:p>
             <a:fld id="{2E5861C8-6E59-4B49-805F-F09502E84273}" type="datetimeFigureOut">
               <a:rPr lang="he-IL" smtClean="0"/>
-              <a:t>כ"ט/טבת/תשפ"ב</a:t>
+              <a:t>א'/שבט/תשפ"ב</a:t>
             </a:fld>
             <a:endParaRPr lang="he-IL"/>
           </a:p>
@@ -15954,7 +15954,7 @@
           <a:p>
             <a:fld id="{2E5861C8-6E59-4B49-805F-F09502E84273}" type="datetimeFigureOut">
               <a:rPr lang="he-IL" smtClean="0"/>
-              <a:t>כ"ט/טבת/תשפ"ב</a:t>
+              <a:t>א'/שבט/תשפ"ב</a:t>
             </a:fld>
             <a:endParaRPr lang="he-IL"/>
           </a:p>
@@ -16124,7 +16124,7 @@
           <a:p>
             <a:fld id="{2E5861C8-6E59-4B49-805F-F09502E84273}" type="datetimeFigureOut">
               <a:rPr lang="he-IL" smtClean="0"/>
-              <a:t>כ"ט/טבת/תשפ"ב</a:t>
+              <a:t>א'/שבט/תשפ"ב</a:t>
             </a:fld>
             <a:endParaRPr lang="he-IL"/>
           </a:p>
@@ -16375,7 +16375,7 @@
           <a:p>
             <a:fld id="{2E5861C8-6E59-4B49-805F-F09502E84273}" type="datetimeFigureOut">
               <a:rPr lang="he-IL" smtClean="0"/>
-              <a:t>כ"ט/טבת/תשפ"ב</a:t>
+              <a:t>א'/שבט/תשפ"ב</a:t>
             </a:fld>
             <a:endParaRPr lang="he-IL"/>
           </a:p>
@@ -16698,7 +16698,7 @@
           <a:p>
             <a:fld id="{2E5861C8-6E59-4B49-805F-F09502E84273}" type="datetimeFigureOut">
               <a:rPr lang="he-IL" smtClean="0"/>
-              <a:t>כ"ט/טבת/תשפ"ב</a:t>
+              <a:t>א'/שבט/תשפ"ב</a:t>
             </a:fld>
             <a:endParaRPr lang="he-IL"/>
           </a:p>
@@ -17122,7 +17122,7 @@
           <a:p>
             <a:fld id="{2E5861C8-6E59-4B49-805F-F09502E84273}" type="datetimeFigureOut">
               <a:rPr lang="he-IL" smtClean="0"/>
-              <a:t>כ"ט/טבת/תשפ"ב</a:t>
+              <a:t>א'/שבט/תשפ"ב</a:t>
             </a:fld>
             <a:endParaRPr lang="he-IL"/>
           </a:p>
@@ -17240,7 +17240,7 @@
           <a:p>
             <a:fld id="{2E5861C8-6E59-4B49-805F-F09502E84273}" type="datetimeFigureOut">
               <a:rPr lang="he-IL" smtClean="0"/>
-              <a:t>כ"ט/טבת/תשפ"ב</a:t>
+              <a:t>א'/שבט/תשפ"ב</a:t>
             </a:fld>
             <a:endParaRPr lang="he-IL"/>
           </a:p>
@@ -17335,7 +17335,7 @@
           <a:p>
             <a:fld id="{2E5861C8-6E59-4B49-805F-F09502E84273}" type="datetimeFigureOut">
               <a:rPr lang="he-IL" smtClean="0"/>
-              <a:t>כ"ט/טבת/תשפ"ב</a:t>
+              <a:t>א'/שבט/תשפ"ב</a:t>
             </a:fld>
             <a:endParaRPr lang="he-IL"/>
           </a:p>
@@ -17625,7 +17625,7 @@
           <a:p>
             <a:fld id="{2E5861C8-6E59-4B49-805F-F09502E84273}" type="datetimeFigureOut">
               <a:rPr lang="he-IL" smtClean="0"/>
-              <a:t>כ"ט/טבת/תשפ"ב</a:t>
+              <a:t>א'/שבט/תשפ"ב</a:t>
             </a:fld>
             <a:endParaRPr lang="he-IL"/>
           </a:p>
@@ -17897,7 +17897,7 @@
           <a:p>
             <a:fld id="{2E5861C8-6E59-4B49-805F-F09502E84273}" type="datetimeFigureOut">
               <a:rPr lang="he-IL" smtClean="0"/>
-              <a:t>כ"ט/טבת/תשפ"ב</a:t>
+              <a:t>א'/שבט/תשפ"ב</a:t>
             </a:fld>
             <a:endParaRPr lang="he-IL"/>
           </a:p>
@@ -18151,7 +18151,7 @@
           <a:p>
             <a:fld id="{2E5861C8-6E59-4B49-805F-F09502E84273}" type="datetimeFigureOut">
               <a:rPr lang="he-IL" smtClean="0"/>
-              <a:t>כ"ט/טבת/תשפ"ב</a:t>
+              <a:t>א'/שבט/תשפ"ב</a:t>
             </a:fld>
             <a:endParaRPr lang="he-IL"/>
           </a:p>
@@ -22289,10 +22289,10 @@
       </p:grpSpPr>
       <p:sp>
         <p:nvSpPr>
-          <p:cNvPr id="47" name="Rectangle 46">
+          <p:cNvPr id="64" name="Rectangle 63">
             <a:extLst>
               <a:ext uri="{FF2B5EF4-FFF2-40B4-BE49-F238E27FC236}">
-                <a16:creationId xmlns:a16="http://schemas.microsoft.com/office/drawing/2014/main" id="{368A5362-EC3B-4BE3-804B-E6B289AF8A36}"/>
+                <a16:creationId xmlns:a16="http://schemas.microsoft.com/office/drawing/2014/main" id="{6C0DD7BF-8F3D-4D34-A37A-85563D3D62FF}"/>
               </a:ext>
               <a:ext uri="{C183D7F6-B498-43B3-948B-1728B52AA6E4}">
                 <adec:decorative xmlns:adec="http://schemas.microsoft.com/office/drawing/2017/decorative" val="1"/>
@@ -22344,10 +22344,10 @@
       </p:sp>
       <p:sp>
         <p:nvSpPr>
-          <p:cNvPr id="49" name="Rectangle 48">
+          <p:cNvPr id="66" name="Rectangle 65">
             <a:extLst>
               <a:ext uri="{FF2B5EF4-FFF2-40B4-BE49-F238E27FC236}">
-                <a16:creationId xmlns:a16="http://schemas.microsoft.com/office/drawing/2014/main" id="{1D37744E-F5F6-4ED5-9F5F-21183A8FE771}"/>
+                <a16:creationId xmlns:a16="http://schemas.microsoft.com/office/drawing/2014/main" id="{A82C64D9-D855-4343-BB40-3E465EFFA0B6}"/>
               </a:ext>
               <a:ext uri="{C183D7F6-B498-43B3-948B-1728B52AA6E4}">
                 <adec:decorative xmlns:adec="http://schemas.microsoft.com/office/drawing/2017/decorative" val="1"/>
@@ -22401,10 +22401,10 @@
       </p:sp>
       <p:cxnSp>
         <p:nvCxnSpPr>
-          <p:cNvPr id="51" name="Straight Connector 50">
+          <p:cNvPr id="68" name="Straight Connector 67">
             <a:extLst>
               <a:ext uri="{FF2B5EF4-FFF2-40B4-BE49-F238E27FC236}">
-                <a16:creationId xmlns:a16="http://schemas.microsoft.com/office/drawing/2014/main" id="{DD9D7C55-D0C1-4B48-ADC5-A9E322B19608}"/>
+                <a16:creationId xmlns:a16="http://schemas.microsoft.com/office/drawing/2014/main" id="{106D061A-80BB-4A08-8350-176FFFDCC32C}"/>
               </a:ext>
               <a:ext uri="{C183D7F6-B498-43B3-948B-1728B52AA6E4}">
                 <adec:decorative xmlns:adec="http://schemas.microsoft.com/office/drawing/2017/decorative" val="1"/>
@@ -22451,123 +22451,12 @@
           </a:fontRef>
         </p:style>
       </p:cxnSp>
-      <p:sp>
-        <p:nvSpPr>
-          <p:cNvPr id="53" name="Rectangle 52">
+      <p:cxnSp>
+        <p:nvCxnSpPr>
+          <p:cNvPr id="70" name="Straight Connector 69">
             <a:extLst>
               <a:ext uri="{FF2B5EF4-FFF2-40B4-BE49-F238E27FC236}">
-                <a16:creationId xmlns:a16="http://schemas.microsoft.com/office/drawing/2014/main" id="{AF76D8A0-F840-44FD-94A8-A20CBDF8DEC0}"/>
-              </a:ext>
-              <a:ext uri="{C183D7F6-B498-43B3-948B-1728B52AA6E4}">
-                <adec:decorative xmlns:adec="http://schemas.microsoft.com/office/drawing/2017/decorative" val="1"/>
-              </a:ext>
-            </a:extLst>
-          </p:cNvPr>
-          <p:cNvSpPr>
-            <a:spLocks noGrp="1" noRot="1" noChangeAspect="1" noMove="1" noResize="1" noEditPoints="1" noAdjustHandles="1" noChangeArrowheads="1" noChangeShapeType="1" noTextEdit="1"/>
-          </p:cNvSpPr>
-          <p:nvPr>
-            <p:extLst>
-              <p:ext uri="{386F3935-93C4-4BCD-93E2-E3B085C9AB24}">
-                <p16:designElem xmlns:p16="http://schemas.microsoft.com/office/powerpoint/2015/main" val="1"/>
-              </p:ext>
-            </p:extLst>
-          </p:nvPr>
-        </p:nvSpPr>
-        <p:spPr>
-          <a:xfrm>
-            <a:off x="231140" y="243840"/>
-            <a:ext cx="11722100" cy="6377939"/>
-          </a:xfrm>
-          <a:prstGeom prst="rect">
-            <a:avLst/>
-          </a:prstGeom>
-          <a:solidFill>
-            <a:schemeClr val="bg1"/>
-          </a:solidFill>
-          <a:ln w="12700">
-            <a:solidFill>
-              <a:srgbClr val="FFFFFF"/>
-            </a:solidFill>
-          </a:ln>
-        </p:spPr>
-        <p:style>
-          <a:lnRef idx="2">
-            <a:schemeClr val="accent1">
-              <a:shade val="50000"/>
-            </a:schemeClr>
-          </a:lnRef>
-          <a:fillRef idx="1">
-            <a:schemeClr val="accent1"/>
-          </a:fillRef>
-          <a:effectRef idx="0">
-            <a:schemeClr val="accent1"/>
-          </a:effectRef>
-          <a:fontRef idx="minor">
-            <a:schemeClr val="lt1"/>
-          </a:fontRef>
-        </p:style>
-      </p:sp>
-      <p:sp useBgFill="1">
-        <p:nvSpPr>
-          <p:cNvPr id="55" name="Rectangle 54">
-            <a:extLst>
-              <a:ext uri="{FF2B5EF4-FFF2-40B4-BE49-F238E27FC236}">
-                <a16:creationId xmlns:a16="http://schemas.microsoft.com/office/drawing/2014/main" id="{CC844B5A-A65D-41B5-8242-5470C11DC34A}"/>
-              </a:ext>
-              <a:ext uri="{C183D7F6-B498-43B3-948B-1728B52AA6E4}">
-                <adec:decorative xmlns:adec="http://schemas.microsoft.com/office/drawing/2017/decorative" val="1"/>
-              </a:ext>
-            </a:extLst>
-          </p:cNvPr>
-          <p:cNvSpPr>
-            <a:spLocks noGrp="1" noRot="1" noChangeAspect="1" noMove="1" noResize="1" noEditPoints="1" noAdjustHandles="1" noChangeArrowheads="1" noChangeShapeType="1" noTextEdit="1"/>
-          </p:cNvSpPr>
-          <p:nvPr>
-            <p:extLst>
-              <p:ext uri="{386F3935-93C4-4BCD-93E2-E3B085C9AB24}">
-                <p16:designElem xmlns:p16="http://schemas.microsoft.com/office/powerpoint/2015/main" val="1"/>
-              </p:ext>
-            </p:extLst>
-          </p:nvPr>
-        </p:nvSpPr>
-        <p:spPr>
-          <a:xfrm>
-            <a:off x="6089378" y="246887"/>
-            <a:ext cx="5861321" cy="6377939"/>
-          </a:xfrm>
-          <a:prstGeom prst="rect">
-            <a:avLst/>
-          </a:prstGeom>
-          <a:ln w="12700">
-            <a:solidFill>
-              <a:srgbClr val="FFFFFF"/>
-            </a:solidFill>
-          </a:ln>
-        </p:spPr>
-        <p:style>
-          <a:lnRef idx="2">
-            <a:schemeClr val="accent1">
-              <a:shade val="50000"/>
-            </a:schemeClr>
-          </a:lnRef>
-          <a:fillRef idx="1">
-            <a:schemeClr val="accent1"/>
-          </a:fillRef>
-          <a:effectRef idx="0">
-            <a:schemeClr val="accent1"/>
-          </a:effectRef>
-          <a:fontRef idx="minor">
-            <a:schemeClr val="lt1"/>
-          </a:fontRef>
-        </p:style>
-      </p:sp>
-      <p:cxnSp>
-        <p:nvCxnSpPr>
-          <p:cNvPr id="57" name="Straight Connector 56">
-            <a:extLst>
-              <a:ext uri="{FF2B5EF4-FFF2-40B4-BE49-F238E27FC236}">
-                <a16:creationId xmlns:a16="http://schemas.microsoft.com/office/drawing/2014/main" id="{76795CB0-CC14-43E3-9440-AD43DE65E17C}"/>
+                <a16:creationId xmlns:a16="http://schemas.microsoft.com/office/drawing/2014/main" id="{A3E92BB3-3613-4DC5-97E0-299B04C46A6E}"/>
               </a:ext>
               <a:ext uri="{C183D7F6-B498-43B3-948B-1728B52AA6E4}">
                 <adec:decorative xmlns:adec="http://schemas.microsoft.com/office/drawing/2017/decorative" val="1"/>
@@ -22587,8 +22476,8 @@
         </p:nvCxnSpPr>
         <p:spPr>
           <a:xfrm>
-            <a:off x="6736924" y="4220801"/>
-            <a:ext cx="4215939" cy="0"/>
+            <a:off x="1978660" y="5462458"/>
+            <a:ext cx="8229601" cy="0"/>
           </a:xfrm>
           <a:prstGeom prst="line">
             <a:avLst/>
@@ -22616,61 +22505,6 @@
       </p:cxnSp>
       <p:sp>
         <p:nvSpPr>
-          <p:cNvPr id="59" name="Rectangle 58">
-            <a:extLst>
-              <a:ext uri="{FF2B5EF4-FFF2-40B4-BE49-F238E27FC236}">
-                <a16:creationId xmlns:a16="http://schemas.microsoft.com/office/drawing/2014/main" id="{14AE8570-D9D3-44BE-A679-3A4B0F1C2747}"/>
-              </a:ext>
-              <a:ext uri="{C183D7F6-B498-43B3-948B-1728B52AA6E4}">
-                <adec:decorative xmlns:adec="http://schemas.microsoft.com/office/drawing/2017/decorative" val="1"/>
-              </a:ext>
-            </a:extLst>
-          </p:cNvPr>
-          <p:cNvSpPr>
-            <a:spLocks noGrp="1" noRot="1" noChangeAspect="1" noMove="1" noResize="1" noEditPoints="1" noAdjustHandles="1" noChangeArrowheads="1" noChangeShapeType="1" noTextEdit="1"/>
-          </p:cNvSpPr>
-          <p:nvPr>
-            <p:extLst>
-              <p:ext uri="{386F3935-93C4-4BCD-93E2-E3B085C9AB24}">
-                <p16:designElem xmlns:p16="http://schemas.microsoft.com/office/powerpoint/2015/main" val="1"/>
-              </p:ext>
-            </p:extLst>
-          </p:nvPr>
-        </p:nvSpPr>
-        <p:spPr>
-          <a:xfrm>
-            <a:off x="228600" y="246888"/>
-            <a:ext cx="11724640" cy="6377939"/>
-          </a:xfrm>
-          <a:prstGeom prst="rect">
-            <a:avLst/>
-          </a:prstGeom>
-          <a:noFill/>
-          <a:ln w="12700">
-            <a:solidFill>
-              <a:srgbClr val="FFFFFF"/>
-            </a:solidFill>
-          </a:ln>
-        </p:spPr>
-        <p:style>
-          <a:lnRef idx="2">
-            <a:schemeClr val="accent1">
-              <a:shade val="50000"/>
-            </a:schemeClr>
-          </a:lnRef>
-          <a:fillRef idx="1">
-            <a:schemeClr val="accent1"/>
-          </a:fillRef>
-          <a:effectRef idx="0">
-            <a:schemeClr val="accent1"/>
-          </a:effectRef>
-          <a:fontRef idx="minor">
-            <a:schemeClr val="lt1"/>
-          </a:fontRef>
-        </p:style>
-      </p:sp>
-      <p:sp>
-        <p:nvSpPr>
           <p:cNvPr id="2" name="Title 1">
             <a:extLst>
               <a:ext uri="{FF2B5EF4-FFF2-40B4-BE49-F238E27FC236}">
@@ -22687,8 +22521,8 @@
         </p:nvSpPr>
         <p:spPr>
           <a:xfrm>
-            <a:off x="6736924" y="857675"/>
-            <a:ext cx="4566230" cy="3437782"/>
+            <a:off x="992777" y="296827"/>
+            <a:ext cx="9966960" cy="1325880"/>
           </a:xfrm>
         </p:spPr>
         <p:txBody>
@@ -22703,22 +22537,86 @@
               </a:lnSpc>
             </a:pPr>
             <a:r>
-              <a:rPr lang="en-US" sz="7200" b="1" cap="all">
+              <a:rPr lang="en-US" sz="6600" b="1" cap="all" dirty="0" err="1">
                 <a:solidFill>
                   <a:srgbClr val="FFFFFF"/>
                 </a:solidFill>
               </a:rPr>
-              <a:t>לוח זמנים</a:t>
+              <a:t>לוח</a:t>
             </a:r>
+            <a:r>
+              <a:rPr lang="en-US" sz="6600" b="1" cap="all" dirty="0">
+                <a:solidFill>
+                  <a:srgbClr val="FFFFFF"/>
+                </a:solidFill>
+              </a:rPr>
+              <a:t> </a:t>
+            </a:r>
+            <a:r>
+              <a:rPr lang="en-US" sz="6600" b="1" cap="all" dirty="0" err="1">
+                <a:solidFill>
+                  <a:srgbClr val="FFFFFF"/>
+                </a:solidFill>
+              </a:rPr>
+              <a:t>זמנים</a:t>
+            </a:r>
+            <a:endParaRPr lang="en-US" sz="6600" b="1" cap="all" dirty="0">
+              <a:solidFill>
+                <a:srgbClr val="FFFFFF"/>
+              </a:solidFill>
+            </a:endParaRPr>
           </a:p>
         </p:txBody>
       </p:sp>
+      <p:cxnSp>
+        <p:nvCxnSpPr>
+          <p:cNvPr id="11" name="מחבר ישר 10">
+            <a:extLst>
+              <a:ext uri="{FF2B5EF4-FFF2-40B4-BE49-F238E27FC236}">
+                <a16:creationId xmlns:a16="http://schemas.microsoft.com/office/drawing/2014/main" id="{EFFEE7FF-23D7-412C-97A9-00ED21D468D7}"/>
+              </a:ext>
+            </a:extLst>
+          </p:cNvPr>
+          <p:cNvCxnSpPr>
+            <a:cxnSpLocks/>
+          </p:cNvCxnSpPr>
+          <p:nvPr/>
+        </p:nvCxnSpPr>
+        <p:spPr>
+          <a:xfrm>
+            <a:off x="2186758" y="1622707"/>
+            <a:ext cx="7813404" cy="0"/>
+          </a:xfrm>
+          <a:prstGeom prst="line">
+            <a:avLst/>
+          </a:prstGeom>
+          <a:ln>
+            <a:solidFill>
+              <a:schemeClr val="bg1"/>
+            </a:solidFill>
+          </a:ln>
+        </p:spPr>
+        <p:style>
+          <a:lnRef idx="1">
+            <a:schemeClr val="accent1"/>
+          </a:lnRef>
+          <a:fillRef idx="0">
+            <a:schemeClr val="accent1"/>
+          </a:fillRef>
+          <a:effectRef idx="0">
+            <a:schemeClr val="accent1"/>
+          </a:effectRef>
+          <a:fontRef idx="minor">
+            <a:schemeClr val="tx1"/>
+          </a:fontRef>
+        </p:style>
+      </p:cxnSp>
       <p:pic>
         <p:nvPicPr>
-          <p:cNvPr id="20" name="Content Placeholder 19">
+          <p:cNvPr id="16" name="מציין מיקום תוכן 15">
             <a:extLst>
               <a:ext uri="{FF2B5EF4-FFF2-40B4-BE49-F238E27FC236}">
-                <a16:creationId xmlns:a16="http://schemas.microsoft.com/office/drawing/2014/main" id="{56ADAA21-A34B-41CB-88FA-4B9F2DA91DD1}"/>
+                <a16:creationId xmlns:a16="http://schemas.microsoft.com/office/drawing/2014/main" id="{CBB03B1A-AA9C-4425-AF7C-134865F16AFD}"/>
               </a:ext>
             </a:extLst>
           </p:cNvPr>
@@ -22730,37 +22628,7 @@
           </p:nvPr>
         </p:nvPicPr>
         <p:blipFill>
-          <a:blip r:embed="rId2"/>
-          <a:stretch>
-            <a:fillRect/>
-          </a:stretch>
-        </p:blipFill>
-        <p:spPr>
-          <a:xfrm>
-            <a:off x="226060" y="240792"/>
-            <a:ext cx="5961380" cy="6426707"/>
-          </a:xfrm>
-          <a:prstGeom prst="rect">
-            <a:avLst/>
-          </a:prstGeom>
-        </p:spPr>
-      </p:pic>
-      <p:pic>
-        <p:nvPicPr>
-          <p:cNvPr id="4" name="תמונה 3" descr="תמונה שמכילה שעון&#10;&#10;התיאור נוצר באופן אוטומטי">
-            <a:extLst>
-              <a:ext uri="{FF2B5EF4-FFF2-40B4-BE49-F238E27FC236}">
-                <a16:creationId xmlns:a16="http://schemas.microsoft.com/office/drawing/2014/main" id="{6894BC4A-9491-4A79-8011-88801E2A4041}"/>
-              </a:ext>
-            </a:extLst>
-          </p:cNvPr>
-          <p:cNvPicPr>
-            <a:picLocks noChangeAspect="1"/>
-          </p:cNvPicPr>
-          <p:nvPr/>
-        </p:nvPicPr>
-        <p:blipFill>
-          <a:blip r:embed="rId3">
+          <a:blip r:embed="rId2">
             <a:extLst>
               <a:ext uri="{28A0092B-C50C-407E-A947-70E740481C1C}">
                 <a14:useLocalDpi xmlns:a14="http://schemas.microsoft.com/office/drawing/2010/main" val="0"/>
@@ -22773,18 +22641,15 @@
         </p:blipFill>
         <p:spPr>
           <a:xfrm>
-            <a:off x="7520998" y="653604"/>
-            <a:ext cx="2777160" cy="2314300"/>
+            <a:off x="389827" y="1943644"/>
+            <a:ext cx="11407266" cy="3505197"/>
           </a:xfrm>
-          <a:prstGeom prst="rect">
-            <a:avLst/>
-          </a:prstGeom>
         </p:spPr>
       </p:pic>
     </p:spTree>
     <p:extLst>
       <p:ext uri="{BB962C8B-B14F-4D97-AF65-F5344CB8AC3E}">
-        <p14:creationId xmlns:p14="http://schemas.microsoft.com/office/powerpoint/2010/main" val="447176048"/>
+        <p14:creationId xmlns:p14="http://schemas.microsoft.com/office/powerpoint/2010/main" val="2753580546"/>
       </p:ext>
     </p:extLst>
   </p:cSld>

</xml_diff>